<commit_message>
Finished ERD and associated Tables design.
</commit_message>
<xml_diff>
--- a/DesignSpecification.pptx
+++ b/DesignSpecification.pptx
@@ -14,7 +14,9 @@
     <p:sldId id="262" r:id="rId8"/>
     <p:sldId id="263" r:id="rId9"/>
     <p:sldId id="264" r:id="rId10"/>
-    <p:sldId id="265" r:id="rId11"/>
+    <p:sldId id="267" r:id="rId11"/>
+    <p:sldId id="266" r:id="rId12"/>
+    <p:sldId id="265" r:id="rId13"/>
   </p:sldIdLst>
   <p:sldSz cx="12192000" cy="6858000"/>
   <p:notesSz cx="6858000" cy="9144000"/>
@@ -3450,6 +3452,1460 @@
           <p:cNvPr id="2" name="Title 1">
             <a:extLst>
               <a:ext uri="{FF2B5EF4-FFF2-40B4-BE49-F238E27FC236}">
+                <a16:creationId xmlns:a16="http://schemas.microsoft.com/office/drawing/2014/main" id="{509D9326-567C-4EDA-804B-04887162EBA0}"/>
+              </a:ext>
+            </a:extLst>
+          </p:cNvPr>
+          <p:cNvSpPr>
+            <a:spLocks noGrp="1"/>
+          </p:cNvSpPr>
+          <p:nvPr>
+            <p:ph type="title"/>
+          </p:nvPr>
+        </p:nvSpPr>
+        <p:spPr/>
+        <p:txBody>
+          <a:bodyPr/>
+          <a:lstStyle/>
+          <a:p>
+            <a:r>
+              <a:rPr lang="en-GB" dirty="0"/>
+              <a:t>ER Diagram (Compressed Chen Notation)</a:t>
+            </a:r>
+          </a:p>
+        </p:txBody>
+      </p:sp>
+      <p:pic>
+        <p:nvPicPr>
+          <p:cNvPr id="5" name="Picture 4">
+            <a:extLst>
+              <a:ext uri="{FF2B5EF4-FFF2-40B4-BE49-F238E27FC236}">
+                <a16:creationId xmlns:a16="http://schemas.microsoft.com/office/drawing/2014/main" id="{E96FFA1F-7AA2-4F8F-8A25-EA4B6910E204}"/>
+              </a:ext>
+            </a:extLst>
+          </p:cNvPr>
+          <p:cNvPicPr>
+            <a:picLocks noChangeAspect="1"/>
+          </p:cNvPicPr>
+          <p:nvPr/>
+        </p:nvPicPr>
+        <p:blipFill>
+          <a:blip r:embed="rId2"/>
+          <a:stretch>
+            <a:fillRect/>
+          </a:stretch>
+        </p:blipFill>
+        <p:spPr>
+          <a:xfrm>
+            <a:off x="2435289" y="1489574"/>
+            <a:ext cx="6521903" cy="4518109"/>
+          </a:xfrm>
+          <a:prstGeom prst="rect">
+            <a:avLst/>
+          </a:prstGeom>
+        </p:spPr>
+      </p:pic>
+    </p:spTree>
+    <p:extLst>
+      <p:ext uri="{BB962C8B-B14F-4D97-AF65-F5344CB8AC3E}">
+        <p14:creationId xmlns:p14="http://schemas.microsoft.com/office/powerpoint/2010/main" val="3123256431"/>
+      </p:ext>
+    </p:extLst>
+  </p:cSld>
+  <p:clrMapOvr>
+    <a:masterClrMapping/>
+  </p:clrMapOvr>
+</p:sld>
+</file>
+
+<file path=ppt/slides/slide11.xml><?xml version="1.0" encoding="utf-8"?>
+<p:sld xmlns:a="http://schemas.openxmlformats.org/drawingml/2006/main" xmlns:r="http://schemas.openxmlformats.org/officeDocument/2006/relationships" xmlns:p="http://schemas.openxmlformats.org/presentationml/2006/main">
+  <p:cSld>
+    <p:spTree>
+      <p:nvGrpSpPr>
+        <p:cNvPr id="1" name=""/>
+        <p:cNvGrpSpPr/>
+        <p:nvPr/>
+      </p:nvGrpSpPr>
+      <p:grpSpPr>
+        <a:xfrm>
+          <a:off x="0" y="0"/>
+          <a:ext cx="0" cy="0"/>
+          <a:chOff x="0" y="0"/>
+          <a:chExt cx="0" cy="0"/>
+        </a:xfrm>
+      </p:grpSpPr>
+      <p:sp>
+        <p:nvSpPr>
+          <p:cNvPr id="2" name="Title 1">
+            <a:extLst>
+              <a:ext uri="{FF2B5EF4-FFF2-40B4-BE49-F238E27FC236}">
+                <a16:creationId xmlns:a16="http://schemas.microsoft.com/office/drawing/2014/main" id="{57B4A3B3-F011-41DA-91C7-9D910AB5BF63}"/>
+              </a:ext>
+            </a:extLst>
+          </p:cNvPr>
+          <p:cNvSpPr>
+            <a:spLocks noGrp="1"/>
+          </p:cNvSpPr>
+          <p:nvPr>
+            <p:ph type="title"/>
+          </p:nvPr>
+        </p:nvSpPr>
+        <p:spPr/>
+        <p:txBody>
+          <a:bodyPr/>
+          <a:lstStyle/>
+          <a:p>
+            <a:r>
+              <a:rPr lang="en-GB" dirty="0"/>
+              <a:t>ER Diagram (Expansion)</a:t>
+            </a:r>
+          </a:p>
+        </p:txBody>
+      </p:sp>
+      <p:graphicFrame>
+        <p:nvGraphicFramePr>
+          <p:cNvPr id="6" name="Table 4">
+            <a:extLst>
+              <a:ext uri="{FF2B5EF4-FFF2-40B4-BE49-F238E27FC236}">
+                <a16:creationId xmlns:a16="http://schemas.microsoft.com/office/drawing/2014/main" id="{8FAD953A-A1C5-4E63-A82F-5564F91CBDE8}"/>
+              </a:ext>
+            </a:extLst>
+          </p:cNvPr>
+          <p:cNvGraphicFramePr>
+            <a:graphicFrameLocks noGrp="1"/>
+          </p:cNvGraphicFramePr>
+          <p:nvPr>
+            <p:extLst>
+              <p:ext uri="{D42A27DB-BD31-4B8C-83A1-F6EECF244321}">
+                <p14:modId xmlns:p14="http://schemas.microsoft.com/office/powerpoint/2010/main" val="2340865260"/>
+              </p:ext>
+            </p:extLst>
+          </p:nvPr>
+        </p:nvGraphicFramePr>
+        <p:xfrm>
+          <a:off x="211615" y="1609483"/>
+          <a:ext cx="5552000" cy="1325565"/>
+        </p:xfrm>
+        <a:graphic>
+          <a:graphicData uri="http://schemas.openxmlformats.org/drawingml/2006/table">
+            <a:tbl>
+              <a:tblPr firstRow="1" bandRow="1">
+                <a:tableStyleId>{5C22544A-7EE6-4342-B048-85BDC9FD1C3A}</a:tableStyleId>
+              </a:tblPr>
+              <a:tblGrid>
+                <a:gridCol w="2776000">
+                  <a:extLst>
+                    <a:ext uri="{9D8B030D-6E8A-4147-A177-3AD203B41FA5}">
+                      <a16:colId xmlns:a16="http://schemas.microsoft.com/office/drawing/2014/main" val="2391090108"/>
+                    </a:ext>
+                  </a:extLst>
+                </a:gridCol>
+                <a:gridCol w="2776000">
+                  <a:extLst>
+                    <a:ext uri="{9D8B030D-6E8A-4147-A177-3AD203B41FA5}">
+                      <a16:colId xmlns:a16="http://schemas.microsoft.com/office/drawing/2014/main" val="3051588018"/>
+                    </a:ext>
+                  </a:extLst>
+                </a:gridCol>
+              </a:tblGrid>
+              <a:tr h="265113">
+                <a:tc>
+                  <a:txBody>
+                    <a:bodyPr/>
+                    <a:lstStyle/>
+                    <a:p>
+                      <a:r>
+                        <a:rPr lang="en-GB" sz="1200" dirty="0"/>
+                        <a:t>Field</a:t>
+                      </a:r>
+                    </a:p>
+                  </a:txBody>
+                  <a:tcPr marL="62460" marR="62460" marT="31230" marB="31230"/>
+                </a:tc>
+                <a:tc>
+                  <a:txBody>
+                    <a:bodyPr/>
+                    <a:lstStyle/>
+                    <a:p>
+                      <a:r>
+                        <a:rPr lang="en-GB" sz="1200" dirty="0"/>
+                        <a:t>Type</a:t>
+                      </a:r>
+                    </a:p>
+                  </a:txBody>
+                  <a:tcPr marL="62460" marR="62460" marT="31230" marB="31230"/>
+                </a:tc>
+                <a:extLst>
+                  <a:ext uri="{0D108BD9-81ED-4DB2-BD59-A6C34878D82A}">
+                    <a16:rowId xmlns:a16="http://schemas.microsoft.com/office/drawing/2014/main" val="4150427295"/>
+                  </a:ext>
+                </a:extLst>
+              </a:tr>
+              <a:tr h="265113">
+                <a:tc>
+                  <a:txBody>
+                    <a:bodyPr/>
+                    <a:lstStyle/>
+                    <a:p>
+                      <a:r>
+                        <a:rPr lang="en-GB" sz="1200" b="1" u="sng" dirty="0" err="1"/>
+                        <a:t>user_ID</a:t>
+                      </a:r>
+                      <a:endParaRPr lang="en-GB" sz="1200" dirty="0"/>
+                    </a:p>
+                  </a:txBody>
+                  <a:tcPr marL="62460" marR="62460" marT="31230" marB="31230"/>
+                </a:tc>
+                <a:tc>
+                  <a:txBody>
+                    <a:bodyPr/>
+                    <a:lstStyle/>
+                    <a:p>
+                      <a:r>
+                        <a:rPr lang="en-GB" sz="1200" dirty="0"/>
+                        <a:t>IntegerField</a:t>
+                      </a:r>
+                    </a:p>
+                  </a:txBody>
+                  <a:tcPr marL="62460" marR="62460" marT="31230" marB="31230"/>
+                </a:tc>
+                <a:extLst>
+                  <a:ext uri="{0D108BD9-81ED-4DB2-BD59-A6C34878D82A}">
+                    <a16:rowId xmlns:a16="http://schemas.microsoft.com/office/drawing/2014/main" val="20519223"/>
+                  </a:ext>
+                </a:extLst>
+              </a:tr>
+              <a:tr h="265113">
+                <a:tc>
+                  <a:txBody>
+                    <a:bodyPr/>
+                    <a:lstStyle/>
+                    <a:p>
+                      <a:r>
+                        <a:rPr lang="en-GB" sz="1200" dirty="0" err="1"/>
+                        <a:t>First_name</a:t>
+                      </a:r>
+                      <a:endParaRPr lang="en-GB" sz="1200" dirty="0"/>
+                    </a:p>
+                  </a:txBody>
+                  <a:tcPr marL="62460" marR="62460" marT="31230" marB="31230"/>
+                </a:tc>
+                <a:tc>
+                  <a:txBody>
+                    <a:bodyPr/>
+                    <a:lstStyle/>
+                    <a:p>
+                      <a:r>
+                        <a:rPr lang="en-GB" sz="1200" dirty="0" err="1"/>
+                        <a:t>CharField</a:t>
+                      </a:r>
+                      <a:r>
+                        <a:rPr lang="en-GB" sz="1200" dirty="0"/>
+                        <a:t>(30)</a:t>
+                      </a:r>
+                    </a:p>
+                  </a:txBody>
+                  <a:tcPr marL="62460" marR="62460" marT="31230" marB="31230"/>
+                </a:tc>
+                <a:extLst>
+                  <a:ext uri="{0D108BD9-81ED-4DB2-BD59-A6C34878D82A}">
+                    <a16:rowId xmlns:a16="http://schemas.microsoft.com/office/drawing/2014/main" val="3097328042"/>
+                  </a:ext>
+                </a:extLst>
+              </a:tr>
+              <a:tr h="265113">
+                <a:tc>
+                  <a:txBody>
+                    <a:bodyPr/>
+                    <a:lstStyle/>
+                    <a:p>
+                      <a:r>
+                        <a:rPr lang="en-GB" sz="1200" dirty="0" err="1"/>
+                        <a:t>Last_name</a:t>
+                      </a:r>
+                      <a:endParaRPr lang="en-GB" sz="1200" dirty="0"/>
+                    </a:p>
+                  </a:txBody>
+                  <a:tcPr marL="62460" marR="62460" marT="31230" marB="31230"/>
+                </a:tc>
+                <a:tc>
+                  <a:txBody>
+                    <a:bodyPr/>
+                    <a:lstStyle/>
+                    <a:p>
+                      <a:r>
+                        <a:rPr lang="en-GB" sz="1200" dirty="0" err="1"/>
+                        <a:t>CharField</a:t>
+                      </a:r>
+                      <a:r>
+                        <a:rPr lang="en-GB" sz="1200" dirty="0"/>
+                        <a:t>(150)</a:t>
+                      </a:r>
+                    </a:p>
+                  </a:txBody>
+                  <a:tcPr marL="62460" marR="62460" marT="31230" marB="31230"/>
+                </a:tc>
+                <a:extLst>
+                  <a:ext uri="{0D108BD9-81ED-4DB2-BD59-A6C34878D82A}">
+                    <a16:rowId xmlns:a16="http://schemas.microsoft.com/office/drawing/2014/main" val="3932045059"/>
+                  </a:ext>
+                </a:extLst>
+              </a:tr>
+              <a:tr h="265113">
+                <a:tc>
+                  <a:txBody>
+                    <a:bodyPr/>
+                    <a:lstStyle/>
+                    <a:p>
+                      <a:r>
+                        <a:rPr lang="en-GB" sz="1200" dirty="0"/>
+                        <a:t>Email</a:t>
+                      </a:r>
+                    </a:p>
+                  </a:txBody>
+                  <a:tcPr marL="62460" marR="62460" marT="31230" marB="31230"/>
+                </a:tc>
+                <a:tc>
+                  <a:txBody>
+                    <a:bodyPr/>
+                    <a:lstStyle/>
+                    <a:p>
+                      <a:pPr marL="0" marR="0" lvl="0" indent="0" algn="l" defTabSz="914400" rtl="0" eaLnBrk="1" fontAlgn="auto" latinLnBrk="0" hangingPunct="1">
+                        <a:lnSpc>
+                          <a:spcPct val="100000"/>
+                        </a:lnSpc>
+                        <a:spcBef>
+                          <a:spcPts val="0"/>
+                        </a:spcBef>
+                        <a:spcAft>
+                          <a:spcPts val="0"/>
+                        </a:spcAft>
+                        <a:buClrTx/>
+                        <a:buSzTx/>
+                        <a:buFontTx/>
+                        <a:buNone/>
+                        <a:tabLst/>
+                        <a:defRPr/>
+                      </a:pPr>
+                      <a:r>
+                        <a:rPr lang="en-GB" sz="1200" dirty="0" err="1"/>
+                        <a:t>CharField</a:t>
+                      </a:r>
+                      <a:r>
+                        <a:rPr lang="en-GB" sz="1200" dirty="0"/>
+                        <a:t>(200)</a:t>
+                      </a:r>
+                    </a:p>
+                  </a:txBody>
+                  <a:tcPr marL="62460" marR="62460" marT="31230" marB="31230"/>
+                </a:tc>
+                <a:extLst>
+                  <a:ext uri="{0D108BD9-81ED-4DB2-BD59-A6C34878D82A}">
+                    <a16:rowId xmlns:a16="http://schemas.microsoft.com/office/drawing/2014/main" val="4149513090"/>
+                  </a:ext>
+                </a:extLst>
+              </a:tr>
+            </a:tbl>
+          </a:graphicData>
+        </a:graphic>
+      </p:graphicFrame>
+      <p:sp>
+        <p:nvSpPr>
+          <p:cNvPr id="7" name="TextBox 6">
+            <a:extLst>
+              <a:ext uri="{FF2B5EF4-FFF2-40B4-BE49-F238E27FC236}">
+                <a16:creationId xmlns:a16="http://schemas.microsoft.com/office/drawing/2014/main" id="{AFD9380C-4667-4670-BA78-522AA3F9A672}"/>
+              </a:ext>
+            </a:extLst>
+          </p:cNvPr>
+          <p:cNvSpPr txBox="1"/>
+          <p:nvPr/>
+        </p:nvSpPr>
+        <p:spPr>
+          <a:xfrm>
+            <a:off x="108098" y="1260844"/>
+            <a:ext cx="4932393" cy="369332"/>
+          </a:xfrm>
+          <a:prstGeom prst="rect">
+            <a:avLst/>
+          </a:prstGeom>
+          <a:noFill/>
+        </p:spPr>
+        <p:txBody>
+          <a:bodyPr wrap="square" rtlCol="0">
+            <a:spAutoFit/>
+          </a:bodyPr>
+          <a:lstStyle/>
+          <a:p>
+            <a:r>
+              <a:rPr lang="en-GB" dirty="0"/>
+              <a:t>User </a:t>
+            </a:r>
+          </a:p>
+        </p:txBody>
+      </p:sp>
+      <p:graphicFrame>
+        <p:nvGraphicFramePr>
+          <p:cNvPr id="8" name="Table 4">
+            <a:extLst>
+              <a:ext uri="{FF2B5EF4-FFF2-40B4-BE49-F238E27FC236}">
+                <a16:creationId xmlns:a16="http://schemas.microsoft.com/office/drawing/2014/main" id="{C1F12113-43E2-46B0-AF48-7FE694EFCF1D}"/>
+              </a:ext>
+            </a:extLst>
+          </p:cNvPr>
+          <p:cNvGraphicFramePr>
+            <a:graphicFrameLocks noGrp="1"/>
+          </p:cNvGraphicFramePr>
+          <p:nvPr>
+            <p:extLst>
+              <p:ext uri="{D42A27DB-BD31-4B8C-83A1-F6EECF244321}">
+                <p14:modId xmlns:p14="http://schemas.microsoft.com/office/powerpoint/2010/main" val="504049368"/>
+              </p:ext>
+            </p:extLst>
+          </p:nvPr>
+        </p:nvGraphicFramePr>
+        <p:xfrm>
+          <a:off x="211614" y="3408307"/>
+          <a:ext cx="2397388" cy="438280"/>
+        </p:xfrm>
+        <a:graphic>
+          <a:graphicData uri="http://schemas.openxmlformats.org/drawingml/2006/table">
+            <a:tbl>
+              <a:tblPr firstRow="1" bandRow="1">
+                <a:tableStyleId>{5C22544A-7EE6-4342-B048-85BDC9FD1C3A}</a:tableStyleId>
+              </a:tblPr>
+              <a:tblGrid>
+                <a:gridCol w="1198694">
+                  <a:extLst>
+                    <a:ext uri="{9D8B030D-6E8A-4147-A177-3AD203B41FA5}">
+                      <a16:colId xmlns:a16="http://schemas.microsoft.com/office/drawing/2014/main" val="2391090108"/>
+                    </a:ext>
+                  </a:extLst>
+                </a:gridCol>
+                <a:gridCol w="1198694">
+                  <a:extLst>
+                    <a:ext uri="{9D8B030D-6E8A-4147-A177-3AD203B41FA5}">
+                      <a16:colId xmlns:a16="http://schemas.microsoft.com/office/drawing/2014/main" val="3051588018"/>
+                    </a:ext>
+                  </a:extLst>
+                </a:gridCol>
+              </a:tblGrid>
+              <a:tr h="219140">
+                <a:tc>
+                  <a:txBody>
+                    <a:bodyPr/>
+                    <a:lstStyle/>
+                    <a:p>
+                      <a:r>
+                        <a:rPr lang="en-GB" sz="1000" dirty="0"/>
+                        <a:t>Field</a:t>
+                      </a:r>
+                    </a:p>
+                  </a:txBody>
+                  <a:tcPr marL="51629" marR="51629" marT="25814" marB="25814"/>
+                </a:tc>
+                <a:tc>
+                  <a:txBody>
+                    <a:bodyPr/>
+                    <a:lstStyle/>
+                    <a:p>
+                      <a:r>
+                        <a:rPr lang="en-GB" sz="1000" dirty="0"/>
+                        <a:t>Type</a:t>
+                      </a:r>
+                    </a:p>
+                  </a:txBody>
+                  <a:tcPr marL="51629" marR="51629" marT="25814" marB="25814"/>
+                </a:tc>
+                <a:extLst>
+                  <a:ext uri="{0D108BD9-81ED-4DB2-BD59-A6C34878D82A}">
+                    <a16:rowId xmlns:a16="http://schemas.microsoft.com/office/drawing/2014/main" val="4150427295"/>
+                  </a:ext>
+                </a:extLst>
+              </a:tr>
+              <a:tr h="219140">
+                <a:tc>
+                  <a:txBody>
+                    <a:bodyPr/>
+                    <a:lstStyle/>
+                    <a:p>
+                      <a:r>
+                        <a:rPr lang="en-GB" sz="1000" b="1" u="sng" dirty="0" err="1"/>
+                        <a:t>professor_ID</a:t>
+                      </a:r>
+                      <a:r>
+                        <a:rPr lang="en-GB" sz="1000" b="1" u="sng" dirty="0"/>
+                        <a:t>*</a:t>
+                      </a:r>
+                      <a:endParaRPr lang="en-GB" sz="1000" dirty="0"/>
+                    </a:p>
+                  </a:txBody>
+                  <a:tcPr marL="51629" marR="51629" marT="25814" marB="25814"/>
+                </a:tc>
+                <a:tc>
+                  <a:txBody>
+                    <a:bodyPr/>
+                    <a:lstStyle/>
+                    <a:p>
+                      <a:r>
+                        <a:rPr lang="en-GB" sz="1000" dirty="0"/>
+                        <a:t>IntegerField</a:t>
+                      </a:r>
+                    </a:p>
+                  </a:txBody>
+                  <a:tcPr marL="51629" marR="51629" marT="25814" marB="25814"/>
+                </a:tc>
+                <a:extLst>
+                  <a:ext uri="{0D108BD9-81ED-4DB2-BD59-A6C34878D82A}">
+                    <a16:rowId xmlns:a16="http://schemas.microsoft.com/office/drawing/2014/main" val="20519223"/>
+                  </a:ext>
+                </a:extLst>
+              </a:tr>
+            </a:tbl>
+          </a:graphicData>
+        </a:graphic>
+      </p:graphicFrame>
+      <p:sp>
+        <p:nvSpPr>
+          <p:cNvPr id="9" name="TextBox 8">
+            <a:extLst>
+              <a:ext uri="{FF2B5EF4-FFF2-40B4-BE49-F238E27FC236}">
+                <a16:creationId xmlns:a16="http://schemas.microsoft.com/office/drawing/2014/main" id="{17B8DE8A-9782-4998-9365-7856F128EAF5}"/>
+              </a:ext>
+            </a:extLst>
+          </p:cNvPr>
+          <p:cNvSpPr txBox="1"/>
+          <p:nvPr/>
+        </p:nvSpPr>
+        <p:spPr>
+          <a:xfrm>
+            <a:off x="108098" y="3059668"/>
+            <a:ext cx="3565480" cy="369332"/>
+          </a:xfrm>
+          <a:prstGeom prst="rect">
+            <a:avLst/>
+          </a:prstGeom>
+          <a:noFill/>
+        </p:spPr>
+        <p:txBody>
+          <a:bodyPr wrap="square" rtlCol="0">
+            <a:spAutoFit/>
+          </a:bodyPr>
+          <a:lstStyle/>
+          <a:p>
+            <a:r>
+              <a:rPr lang="en-GB" dirty="0"/>
+              <a:t> Professor</a:t>
+            </a:r>
+          </a:p>
+        </p:txBody>
+      </p:sp>
+      <p:graphicFrame>
+        <p:nvGraphicFramePr>
+          <p:cNvPr id="10" name="Table 4">
+            <a:extLst>
+              <a:ext uri="{FF2B5EF4-FFF2-40B4-BE49-F238E27FC236}">
+                <a16:creationId xmlns:a16="http://schemas.microsoft.com/office/drawing/2014/main" id="{688168F3-1C41-434B-81EC-54445C51BA80}"/>
+              </a:ext>
+            </a:extLst>
+          </p:cNvPr>
+          <p:cNvGraphicFramePr>
+            <a:graphicFrameLocks noGrp="1"/>
+          </p:cNvGraphicFramePr>
+          <p:nvPr>
+            <p:extLst>
+              <p:ext uri="{D42A27DB-BD31-4B8C-83A1-F6EECF244321}">
+                <p14:modId xmlns:p14="http://schemas.microsoft.com/office/powerpoint/2010/main" val="182593574"/>
+              </p:ext>
+            </p:extLst>
+          </p:nvPr>
+        </p:nvGraphicFramePr>
+        <p:xfrm>
+          <a:off x="5964551" y="1814842"/>
+          <a:ext cx="5234318" cy="817425"/>
+        </p:xfrm>
+        <a:graphic>
+          <a:graphicData uri="http://schemas.openxmlformats.org/drawingml/2006/table">
+            <a:tbl>
+              <a:tblPr firstRow="1" bandRow="1">
+                <a:tableStyleId>{5C22544A-7EE6-4342-B048-85BDC9FD1C3A}</a:tableStyleId>
+              </a:tblPr>
+              <a:tblGrid>
+                <a:gridCol w="2617159">
+                  <a:extLst>
+                    <a:ext uri="{9D8B030D-6E8A-4147-A177-3AD203B41FA5}">
+                      <a16:colId xmlns:a16="http://schemas.microsoft.com/office/drawing/2014/main" val="2391090108"/>
+                    </a:ext>
+                  </a:extLst>
+                </a:gridCol>
+                <a:gridCol w="2617159">
+                  <a:extLst>
+                    <a:ext uri="{9D8B030D-6E8A-4147-A177-3AD203B41FA5}">
+                      <a16:colId xmlns:a16="http://schemas.microsoft.com/office/drawing/2014/main" val="3051588018"/>
+                    </a:ext>
+                  </a:extLst>
+                </a:gridCol>
+              </a:tblGrid>
+              <a:tr h="272475">
+                <a:tc>
+                  <a:txBody>
+                    <a:bodyPr/>
+                    <a:lstStyle/>
+                    <a:p>
+                      <a:r>
+                        <a:rPr lang="en-GB" sz="1100" dirty="0"/>
+                        <a:t>Field</a:t>
+                      </a:r>
+                    </a:p>
+                  </a:txBody>
+                  <a:tcPr marL="54475" marR="54475" marT="27238" marB="27238"/>
+                </a:tc>
+                <a:tc>
+                  <a:txBody>
+                    <a:bodyPr/>
+                    <a:lstStyle/>
+                    <a:p>
+                      <a:r>
+                        <a:rPr lang="en-GB" sz="1100" dirty="0"/>
+                        <a:t>Type</a:t>
+                      </a:r>
+                    </a:p>
+                  </a:txBody>
+                  <a:tcPr marL="54475" marR="54475" marT="27238" marB="27238"/>
+                </a:tc>
+                <a:extLst>
+                  <a:ext uri="{0D108BD9-81ED-4DB2-BD59-A6C34878D82A}">
+                    <a16:rowId xmlns:a16="http://schemas.microsoft.com/office/drawing/2014/main" val="4150427295"/>
+                  </a:ext>
+                </a:extLst>
+              </a:tr>
+              <a:tr h="272475">
+                <a:tc>
+                  <a:txBody>
+                    <a:bodyPr/>
+                    <a:lstStyle/>
+                    <a:p>
+                      <a:r>
+                        <a:rPr lang="en-GB" sz="1100" b="1" u="none" dirty="0" err="1"/>
+                        <a:t>Course_ID</a:t>
+                      </a:r>
+                      <a:endParaRPr lang="en-GB" sz="1100" b="1" u="none" dirty="0"/>
+                    </a:p>
+                  </a:txBody>
+                  <a:tcPr marL="54475" marR="54475" marT="27238" marB="27238"/>
+                </a:tc>
+                <a:tc>
+                  <a:txBody>
+                    <a:bodyPr/>
+                    <a:lstStyle/>
+                    <a:p>
+                      <a:r>
+                        <a:rPr lang="en-GB" sz="1100" dirty="0"/>
+                        <a:t>IntegerField</a:t>
+                      </a:r>
+                    </a:p>
+                  </a:txBody>
+                  <a:tcPr marL="54475" marR="54475" marT="27238" marB="27238"/>
+                </a:tc>
+                <a:extLst>
+                  <a:ext uri="{0D108BD9-81ED-4DB2-BD59-A6C34878D82A}">
+                    <a16:rowId xmlns:a16="http://schemas.microsoft.com/office/drawing/2014/main" val="20519223"/>
+                  </a:ext>
+                </a:extLst>
+              </a:tr>
+              <a:tr h="272475">
+                <a:tc>
+                  <a:txBody>
+                    <a:bodyPr/>
+                    <a:lstStyle/>
+                    <a:p>
+                      <a:r>
+                        <a:rPr lang="en-GB" sz="1100" dirty="0" err="1"/>
+                        <a:t>courseName</a:t>
+                      </a:r>
+                      <a:endParaRPr lang="en-GB" sz="1100" dirty="0"/>
+                    </a:p>
+                  </a:txBody>
+                  <a:tcPr marL="54475" marR="54475" marT="27238" marB="27238"/>
+                </a:tc>
+                <a:tc>
+                  <a:txBody>
+                    <a:bodyPr/>
+                    <a:lstStyle/>
+                    <a:p>
+                      <a:r>
+                        <a:rPr lang="en-GB" sz="1100" dirty="0" err="1"/>
+                        <a:t>CharField</a:t>
+                      </a:r>
+                      <a:r>
+                        <a:rPr lang="en-GB" sz="1100"/>
+                        <a:t>(50)</a:t>
+                      </a:r>
+                      <a:endParaRPr lang="en-GB" sz="1100" dirty="0"/>
+                    </a:p>
+                  </a:txBody>
+                  <a:tcPr marL="54475" marR="54475" marT="27238" marB="27238"/>
+                </a:tc>
+                <a:extLst>
+                  <a:ext uri="{0D108BD9-81ED-4DB2-BD59-A6C34878D82A}">
+                    <a16:rowId xmlns:a16="http://schemas.microsoft.com/office/drawing/2014/main" val="3097328042"/>
+                  </a:ext>
+                </a:extLst>
+              </a:tr>
+            </a:tbl>
+          </a:graphicData>
+        </a:graphic>
+      </p:graphicFrame>
+      <p:sp>
+        <p:nvSpPr>
+          <p:cNvPr id="11" name="TextBox 10">
+            <a:extLst>
+              <a:ext uri="{FF2B5EF4-FFF2-40B4-BE49-F238E27FC236}">
+                <a16:creationId xmlns:a16="http://schemas.microsoft.com/office/drawing/2014/main" id="{C762E3A5-5883-4CF4-94F0-14B6B2658F9A}"/>
+              </a:ext>
+            </a:extLst>
+          </p:cNvPr>
+          <p:cNvSpPr txBox="1"/>
+          <p:nvPr/>
+        </p:nvSpPr>
+        <p:spPr>
+          <a:xfrm>
+            <a:off x="5861035" y="1466202"/>
+            <a:ext cx="2120896" cy="369332"/>
+          </a:xfrm>
+          <a:prstGeom prst="rect">
+            <a:avLst/>
+          </a:prstGeom>
+          <a:noFill/>
+        </p:spPr>
+        <p:txBody>
+          <a:bodyPr wrap="square" rtlCol="0">
+            <a:spAutoFit/>
+          </a:bodyPr>
+          <a:lstStyle/>
+          <a:p>
+            <a:r>
+              <a:rPr lang="en-GB" dirty="0"/>
+              <a:t>Course</a:t>
+            </a:r>
+          </a:p>
+        </p:txBody>
+      </p:sp>
+      <p:graphicFrame>
+        <p:nvGraphicFramePr>
+          <p:cNvPr id="12" name="Table 4">
+            <a:extLst>
+              <a:ext uri="{FF2B5EF4-FFF2-40B4-BE49-F238E27FC236}">
+                <a16:creationId xmlns:a16="http://schemas.microsoft.com/office/drawing/2014/main" id="{4E028C26-1DD6-46BE-859D-BC8DA5A6DD83}"/>
+              </a:ext>
+            </a:extLst>
+          </p:cNvPr>
+          <p:cNvGraphicFramePr>
+            <a:graphicFrameLocks noGrp="1"/>
+          </p:cNvGraphicFramePr>
+          <p:nvPr>
+            <p:extLst>
+              <p:ext uri="{D42A27DB-BD31-4B8C-83A1-F6EECF244321}">
+                <p14:modId xmlns:p14="http://schemas.microsoft.com/office/powerpoint/2010/main" val="3178746555"/>
+              </p:ext>
+            </p:extLst>
+          </p:nvPr>
+        </p:nvGraphicFramePr>
+        <p:xfrm>
+          <a:off x="211614" y="4393844"/>
+          <a:ext cx="2397388" cy="438280"/>
+        </p:xfrm>
+        <a:graphic>
+          <a:graphicData uri="http://schemas.openxmlformats.org/drawingml/2006/table">
+            <a:tbl>
+              <a:tblPr firstRow="1" bandRow="1">
+                <a:tableStyleId>{5C22544A-7EE6-4342-B048-85BDC9FD1C3A}</a:tableStyleId>
+              </a:tblPr>
+              <a:tblGrid>
+                <a:gridCol w="1198694">
+                  <a:extLst>
+                    <a:ext uri="{9D8B030D-6E8A-4147-A177-3AD203B41FA5}">
+                      <a16:colId xmlns:a16="http://schemas.microsoft.com/office/drawing/2014/main" val="2391090108"/>
+                    </a:ext>
+                  </a:extLst>
+                </a:gridCol>
+                <a:gridCol w="1198694">
+                  <a:extLst>
+                    <a:ext uri="{9D8B030D-6E8A-4147-A177-3AD203B41FA5}">
+                      <a16:colId xmlns:a16="http://schemas.microsoft.com/office/drawing/2014/main" val="3051588018"/>
+                    </a:ext>
+                  </a:extLst>
+                </a:gridCol>
+              </a:tblGrid>
+              <a:tr h="219140">
+                <a:tc>
+                  <a:txBody>
+                    <a:bodyPr/>
+                    <a:lstStyle/>
+                    <a:p>
+                      <a:r>
+                        <a:rPr lang="en-GB" sz="1000" dirty="0"/>
+                        <a:t>Field</a:t>
+                      </a:r>
+                    </a:p>
+                  </a:txBody>
+                  <a:tcPr marL="51629" marR="51629" marT="25814" marB="25814"/>
+                </a:tc>
+                <a:tc>
+                  <a:txBody>
+                    <a:bodyPr/>
+                    <a:lstStyle/>
+                    <a:p>
+                      <a:r>
+                        <a:rPr lang="en-GB" sz="1000" dirty="0"/>
+                        <a:t>Type</a:t>
+                      </a:r>
+                    </a:p>
+                  </a:txBody>
+                  <a:tcPr marL="51629" marR="51629" marT="25814" marB="25814"/>
+                </a:tc>
+                <a:extLst>
+                  <a:ext uri="{0D108BD9-81ED-4DB2-BD59-A6C34878D82A}">
+                    <a16:rowId xmlns:a16="http://schemas.microsoft.com/office/drawing/2014/main" val="4150427295"/>
+                  </a:ext>
+                </a:extLst>
+              </a:tr>
+              <a:tr h="219140">
+                <a:tc>
+                  <a:txBody>
+                    <a:bodyPr/>
+                    <a:lstStyle/>
+                    <a:p>
+                      <a:r>
+                        <a:rPr lang="en-GB" sz="1000" b="1" u="sng" dirty="0" err="1"/>
+                        <a:t>student_ID</a:t>
+                      </a:r>
+                      <a:r>
+                        <a:rPr lang="en-GB" sz="1000" b="1" u="sng" dirty="0"/>
+                        <a:t>*</a:t>
+                      </a:r>
+                      <a:endParaRPr lang="en-GB" sz="1000" dirty="0"/>
+                    </a:p>
+                  </a:txBody>
+                  <a:tcPr marL="51629" marR="51629" marT="25814" marB="25814"/>
+                </a:tc>
+                <a:tc>
+                  <a:txBody>
+                    <a:bodyPr/>
+                    <a:lstStyle/>
+                    <a:p>
+                      <a:r>
+                        <a:rPr lang="en-GB" sz="1000" dirty="0"/>
+                        <a:t>IntegerField</a:t>
+                      </a:r>
+                    </a:p>
+                  </a:txBody>
+                  <a:tcPr marL="51629" marR="51629" marT="25814" marB="25814"/>
+                </a:tc>
+                <a:extLst>
+                  <a:ext uri="{0D108BD9-81ED-4DB2-BD59-A6C34878D82A}">
+                    <a16:rowId xmlns:a16="http://schemas.microsoft.com/office/drawing/2014/main" val="20519223"/>
+                  </a:ext>
+                </a:extLst>
+              </a:tr>
+            </a:tbl>
+          </a:graphicData>
+        </a:graphic>
+      </p:graphicFrame>
+      <p:sp>
+        <p:nvSpPr>
+          <p:cNvPr id="13" name="TextBox 12">
+            <a:extLst>
+              <a:ext uri="{FF2B5EF4-FFF2-40B4-BE49-F238E27FC236}">
+                <a16:creationId xmlns:a16="http://schemas.microsoft.com/office/drawing/2014/main" id="{B83D87BA-367D-4717-B05A-BD4BD150FCD8}"/>
+              </a:ext>
+            </a:extLst>
+          </p:cNvPr>
+          <p:cNvSpPr txBox="1"/>
+          <p:nvPr/>
+        </p:nvSpPr>
+        <p:spPr>
+          <a:xfrm>
+            <a:off x="108098" y="4045205"/>
+            <a:ext cx="3565480" cy="369332"/>
+          </a:xfrm>
+          <a:prstGeom prst="rect">
+            <a:avLst/>
+          </a:prstGeom>
+          <a:noFill/>
+        </p:spPr>
+        <p:txBody>
+          <a:bodyPr wrap="square" rtlCol="0">
+            <a:spAutoFit/>
+          </a:bodyPr>
+          <a:lstStyle/>
+          <a:p>
+            <a:r>
+              <a:rPr lang="en-GB" dirty="0"/>
+              <a:t> Student</a:t>
+            </a:r>
+          </a:p>
+        </p:txBody>
+      </p:sp>
+      <p:graphicFrame>
+        <p:nvGraphicFramePr>
+          <p:cNvPr id="14" name="Table 4">
+            <a:extLst>
+              <a:ext uri="{FF2B5EF4-FFF2-40B4-BE49-F238E27FC236}">
+                <a16:creationId xmlns:a16="http://schemas.microsoft.com/office/drawing/2014/main" id="{6E0FCA1E-A5FB-40F1-891E-D52DCB65EAAC}"/>
+              </a:ext>
+            </a:extLst>
+          </p:cNvPr>
+          <p:cNvGraphicFramePr>
+            <a:graphicFrameLocks noGrp="1"/>
+          </p:cNvGraphicFramePr>
+          <p:nvPr>
+            <p:extLst>
+              <p:ext uri="{D42A27DB-BD31-4B8C-83A1-F6EECF244321}">
+                <p14:modId xmlns:p14="http://schemas.microsoft.com/office/powerpoint/2010/main" val="4172938091"/>
+              </p:ext>
+            </p:extLst>
+          </p:nvPr>
+        </p:nvGraphicFramePr>
+        <p:xfrm>
+          <a:off x="3102154" y="3376632"/>
+          <a:ext cx="5234318" cy="1978814"/>
+        </p:xfrm>
+        <a:graphic>
+          <a:graphicData uri="http://schemas.openxmlformats.org/drawingml/2006/table">
+            <a:tbl>
+              <a:tblPr firstRow="1" bandRow="1">
+                <a:tableStyleId>{5C22544A-7EE6-4342-B048-85BDC9FD1C3A}</a:tableStyleId>
+              </a:tblPr>
+              <a:tblGrid>
+                <a:gridCol w="2617159">
+                  <a:extLst>
+                    <a:ext uri="{9D8B030D-6E8A-4147-A177-3AD203B41FA5}">
+                      <a16:colId xmlns:a16="http://schemas.microsoft.com/office/drawing/2014/main" val="2391090108"/>
+                    </a:ext>
+                  </a:extLst>
+                </a:gridCol>
+                <a:gridCol w="2617159">
+                  <a:extLst>
+                    <a:ext uri="{9D8B030D-6E8A-4147-A177-3AD203B41FA5}">
+                      <a16:colId xmlns:a16="http://schemas.microsoft.com/office/drawing/2014/main" val="3051588018"/>
+                    </a:ext>
+                  </a:extLst>
+                </a:gridCol>
+              </a:tblGrid>
+              <a:tr h="272475">
+                <a:tc>
+                  <a:txBody>
+                    <a:bodyPr/>
+                    <a:lstStyle/>
+                    <a:p>
+                      <a:r>
+                        <a:rPr lang="en-GB" sz="1100" dirty="0"/>
+                        <a:t>Field</a:t>
+                      </a:r>
+                    </a:p>
+                  </a:txBody>
+                  <a:tcPr marL="54475" marR="54475" marT="27238" marB="27238"/>
+                </a:tc>
+                <a:tc>
+                  <a:txBody>
+                    <a:bodyPr/>
+                    <a:lstStyle/>
+                    <a:p>
+                      <a:r>
+                        <a:rPr lang="en-GB" sz="1100" dirty="0"/>
+                        <a:t>Type</a:t>
+                      </a:r>
+                    </a:p>
+                  </a:txBody>
+                  <a:tcPr marL="54475" marR="54475" marT="27238" marB="27238"/>
+                </a:tc>
+                <a:extLst>
+                  <a:ext uri="{0D108BD9-81ED-4DB2-BD59-A6C34878D82A}">
+                    <a16:rowId xmlns:a16="http://schemas.microsoft.com/office/drawing/2014/main" val="4150427295"/>
+                  </a:ext>
+                </a:extLst>
+              </a:tr>
+              <a:tr h="331518">
+                <a:tc>
+                  <a:txBody>
+                    <a:bodyPr/>
+                    <a:lstStyle/>
+                    <a:p>
+                      <a:r>
+                        <a:rPr lang="en-GB" sz="1100" b="1" u="sng" dirty="0" err="1"/>
+                        <a:t>Lecture_ID</a:t>
+                      </a:r>
+                      <a:endParaRPr lang="en-GB" sz="1100" b="1" u="sng" dirty="0"/>
+                    </a:p>
+                  </a:txBody>
+                  <a:tcPr marL="54475" marR="54475" marT="27238" marB="27238"/>
+                </a:tc>
+                <a:tc>
+                  <a:txBody>
+                    <a:bodyPr/>
+                    <a:lstStyle/>
+                    <a:p>
+                      <a:r>
+                        <a:rPr lang="en-GB" sz="1100" dirty="0"/>
+                        <a:t>IntegerField</a:t>
+                      </a:r>
+                    </a:p>
+                  </a:txBody>
+                  <a:tcPr marL="54475" marR="54475" marT="27238" marB="27238"/>
+                </a:tc>
+                <a:extLst>
+                  <a:ext uri="{0D108BD9-81ED-4DB2-BD59-A6C34878D82A}">
+                    <a16:rowId xmlns:a16="http://schemas.microsoft.com/office/drawing/2014/main" val="20519223"/>
+                  </a:ext>
+                </a:extLst>
+              </a:tr>
+              <a:tr h="272475">
+                <a:tc>
+                  <a:txBody>
+                    <a:bodyPr/>
+                    <a:lstStyle/>
+                    <a:p>
+                      <a:r>
+                        <a:rPr lang="en-GB" sz="1100" dirty="0"/>
+                        <a:t>videoURL</a:t>
+                      </a:r>
+                    </a:p>
+                  </a:txBody>
+                  <a:tcPr marL="54475" marR="54475" marT="27238" marB="27238"/>
+                </a:tc>
+                <a:tc>
+                  <a:txBody>
+                    <a:bodyPr/>
+                    <a:lstStyle/>
+                    <a:p>
+                      <a:pPr marL="0" marR="0" lvl="0" indent="0" algn="l" defTabSz="914400" rtl="0" eaLnBrk="1" fontAlgn="auto" latinLnBrk="0" hangingPunct="1">
+                        <a:lnSpc>
+                          <a:spcPct val="100000"/>
+                        </a:lnSpc>
+                        <a:spcBef>
+                          <a:spcPts val="0"/>
+                        </a:spcBef>
+                        <a:spcAft>
+                          <a:spcPts val="0"/>
+                        </a:spcAft>
+                        <a:buClrTx/>
+                        <a:buSzTx/>
+                        <a:buFontTx/>
+                        <a:buNone/>
+                        <a:tabLst/>
+                        <a:defRPr/>
+                      </a:pPr>
+                      <a:r>
+                        <a:rPr lang="en-GB" sz="1100" dirty="0" err="1"/>
+                        <a:t>CharField</a:t>
+                      </a:r>
+                      <a:r>
+                        <a:rPr lang="en-GB" sz="1100" dirty="0"/>
+                        <a:t>(150)</a:t>
+                      </a:r>
+                    </a:p>
+                  </a:txBody>
+                  <a:tcPr marL="54475" marR="54475" marT="27238" marB="27238"/>
+                </a:tc>
+                <a:extLst>
+                  <a:ext uri="{0D108BD9-81ED-4DB2-BD59-A6C34878D82A}">
+                    <a16:rowId xmlns:a16="http://schemas.microsoft.com/office/drawing/2014/main" val="3097328042"/>
+                  </a:ext>
+                </a:extLst>
+              </a:tr>
+              <a:tr h="272475">
+                <a:tc>
+                  <a:txBody>
+                    <a:bodyPr/>
+                    <a:lstStyle/>
+                    <a:p>
+                      <a:r>
+                        <a:rPr lang="en-GB" sz="1100" dirty="0"/>
+                        <a:t>slideShowURL</a:t>
+                      </a:r>
+                    </a:p>
+                  </a:txBody>
+                  <a:tcPr marL="54475" marR="54475" marT="27238" marB="27238"/>
+                </a:tc>
+                <a:tc>
+                  <a:txBody>
+                    <a:bodyPr/>
+                    <a:lstStyle/>
+                    <a:p>
+                      <a:pPr marL="0" marR="0" lvl="0" indent="0" algn="l" defTabSz="914400" rtl="0" eaLnBrk="1" fontAlgn="auto" latinLnBrk="0" hangingPunct="1">
+                        <a:lnSpc>
+                          <a:spcPct val="100000"/>
+                        </a:lnSpc>
+                        <a:spcBef>
+                          <a:spcPts val="0"/>
+                        </a:spcBef>
+                        <a:spcAft>
+                          <a:spcPts val="0"/>
+                        </a:spcAft>
+                        <a:buClrTx/>
+                        <a:buSzTx/>
+                        <a:buFontTx/>
+                        <a:buNone/>
+                        <a:tabLst/>
+                        <a:defRPr/>
+                      </a:pPr>
+                      <a:r>
+                        <a:rPr lang="en-GB" sz="1100" dirty="0" err="1"/>
+                        <a:t>CharField</a:t>
+                      </a:r>
+                      <a:r>
+                        <a:rPr lang="en-GB" sz="1100" dirty="0"/>
+                        <a:t>(150)</a:t>
+                      </a:r>
+                    </a:p>
+                  </a:txBody>
+                  <a:tcPr marL="54475" marR="54475" marT="27238" marB="27238"/>
+                </a:tc>
+                <a:extLst>
+                  <a:ext uri="{0D108BD9-81ED-4DB2-BD59-A6C34878D82A}">
+                    <a16:rowId xmlns:a16="http://schemas.microsoft.com/office/drawing/2014/main" val="1200363246"/>
+                  </a:ext>
+                </a:extLst>
+              </a:tr>
+              <a:tr h="272475">
+                <a:tc>
+                  <a:txBody>
+                    <a:bodyPr/>
+                    <a:lstStyle/>
+                    <a:p>
+                      <a:r>
+                        <a:rPr lang="en-GB" sz="1100" b="1" dirty="0" err="1"/>
+                        <a:t>Course_ID</a:t>
+                      </a:r>
+                      <a:r>
+                        <a:rPr lang="en-GB" sz="1100" dirty="0"/>
+                        <a:t>*</a:t>
+                      </a:r>
+                    </a:p>
+                  </a:txBody>
+                  <a:tcPr marL="54475" marR="54475" marT="27238" marB="27238"/>
+                </a:tc>
+                <a:tc>
+                  <a:txBody>
+                    <a:bodyPr/>
+                    <a:lstStyle/>
+                    <a:p>
+                      <a:r>
+                        <a:rPr lang="en-GB" sz="1100" dirty="0"/>
+                        <a:t>IntegerField</a:t>
+                      </a:r>
+                    </a:p>
+                  </a:txBody>
+                  <a:tcPr marL="54475" marR="54475" marT="27238" marB="27238"/>
+                </a:tc>
+                <a:extLst>
+                  <a:ext uri="{0D108BD9-81ED-4DB2-BD59-A6C34878D82A}">
+                    <a16:rowId xmlns:a16="http://schemas.microsoft.com/office/drawing/2014/main" val="4212254447"/>
+                  </a:ext>
+                </a:extLst>
+              </a:tr>
+              <a:tr h="272475">
+                <a:tc>
+                  <a:txBody>
+                    <a:bodyPr/>
+                    <a:lstStyle/>
+                    <a:p>
+                      <a:r>
+                        <a:rPr lang="en-GB" sz="1100" b="1" dirty="0" err="1"/>
+                        <a:t>Professor_ID</a:t>
+                      </a:r>
+                      <a:r>
+                        <a:rPr lang="en-GB" sz="1100" b="1" dirty="0"/>
+                        <a:t>*</a:t>
+                      </a:r>
+                    </a:p>
+                  </a:txBody>
+                  <a:tcPr marL="54475" marR="54475" marT="27238" marB="27238"/>
+                </a:tc>
+                <a:tc>
+                  <a:txBody>
+                    <a:bodyPr/>
+                    <a:lstStyle/>
+                    <a:p>
+                      <a:r>
+                        <a:rPr lang="en-GB" sz="1100" dirty="0"/>
+                        <a:t>IntegerField, can be null if this lecture was pulled from Moodle (not uploaded manually)</a:t>
+                      </a:r>
+                    </a:p>
+                  </a:txBody>
+                  <a:tcPr marL="54475" marR="54475" marT="27238" marB="27238"/>
+                </a:tc>
+                <a:extLst>
+                  <a:ext uri="{0D108BD9-81ED-4DB2-BD59-A6C34878D82A}">
+                    <a16:rowId xmlns:a16="http://schemas.microsoft.com/office/drawing/2014/main" val="4139509957"/>
+                  </a:ext>
+                </a:extLst>
+              </a:tr>
+            </a:tbl>
+          </a:graphicData>
+        </a:graphic>
+      </p:graphicFrame>
+      <p:sp>
+        <p:nvSpPr>
+          <p:cNvPr id="15" name="TextBox 14">
+            <a:extLst>
+              <a:ext uri="{FF2B5EF4-FFF2-40B4-BE49-F238E27FC236}">
+                <a16:creationId xmlns:a16="http://schemas.microsoft.com/office/drawing/2014/main" id="{3338A273-0B8F-4C88-90EE-6A186091E1BF}"/>
+              </a:ext>
+            </a:extLst>
+          </p:cNvPr>
+          <p:cNvSpPr txBox="1"/>
+          <p:nvPr/>
+        </p:nvSpPr>
+        <p:spPr>
+          <a:xfrm>
+            <a:off x="2998638" y="3027992"/>
+            <a:ext cx="2120896" cy="369332"/>
+          </a:xfrm>
+          <a:prstGeom prst="rect">
+            <a:avLst/>
+          </a:prstGeom>
+          <a:noFill/>
+        </p:spPr>
+        <p:txBody>
+          <a:bodyPr wrap="square" rtlCol="0">
+            <a:spAutoFit/>
+          </a:bodyPr>
+          <a:lstStyle/>
+          <a:p>
+            <a:r>
+              <a:rPr lang="en-GB" dirty="0"/>
+              <a:t>Lecture</a:t>
+            </a:r>
+          </a:p>
+        </p:txBody>
+      </p:sp>
+      <p:graphicFrame>
+        <p:nvGraphicFramePr>
+          <p:cNvPr id="16" name="Table 4">
+            <a:extLst>
+              <a:ext uri="{FF2B5EF4-FFF2-40B4-BE49-F238E27FC236}">
+                <a16:creationId xmlns:a16="http://schemas.microsoft.com/office/drawing/2014/main" id="{4A45FB7B-EF11-4A8B-8516-8C1E53384428}"/>
+              </a:ext>
+            </a:extLst>
+          </p:cNvPr>
+          <p:cNvGraphicFramePr>
+            <a:graphicFrameLocks noGrp="1"/>
+          </p:cNvGraphicFramePr>
+          <p:nvPr>
+            <p:extLst>
+              <p:ext uri="{D42A27DB-BD31-4B8C-83A1-F6EECF244321}">
+                <p14:modId xmlns:p14="http://schemas.microsoft.com/office/powerpoint/2010/main" val="107085356"/>
+              </p:ext>
+            </p:extLst>
+          </p:nvPr>
+        </p:nvGraphicFramePr>
+        <p:xfrm>
+          <a:off x="3102154" y="5632055"/>
+          <a:ext cx="5234318" cy="935511"/>
+        </p:xfrm>
+        <a:graphic>
+          <a:graphicData uri="http://schemas.openxmlformats.org/drawingml/2006/table">
+            <a:tbl>
+              <a:tblPr firstRow="1" bandRow="1">
+                <a:tableStyleId>{5C22544A-7EE6-4342-B048-85BDC9FD1C3A}</a:tableStyleId>
+              </a:tblPr>
+              <a:tblGrid>
+                <a:gridCol w="2617159">
+                  <a:extLst>
+                    <a:ext uri="{9D8B030D-6E8A-4147-A177-3AD203B41FA5}">
+                      <a16:colId xmlns:a16="http://schemas.microsoft.com/office/drawing/2014/main" val="2391090108"/>
+                    </a:ext>
+                  </a:extLst>
+                </a:gridCol>
+                <a:gridCol w="2617159">
+                  <a:extLst>
+                    <a:ext uri="{9D8B030D-6E8A-4147-A177-3AD203B41FA5}">
+                      <a16:colId xmlns:a16="http://schemas.microsoft.com/office/drawing/2014/main" val="3051588018"/>
+                    </a:ext>
+                  </a:extLst>
+                </a:gridCol>
+              </a:tblGrid>
+              <a:tr h="272475">
+                <a:tc>
+                  <a:txBody>
+                    <a:bodyPr/>
+                    <a:lstStyle/>
+                    <a:p>
+                      <a:r>
+                        <a:rPr lang="en-GB" sz="1100" dirty="0"/>
+                        <a:t>Field</a:t>
+                      </a:r>
+                    </a:p>
+                  </a:txBody>
+                  <a:tcPr marL="54475" marR="54475" marT="27238" marB="27238"/>
+                </a:tc>
+                <a:tc>
+                  <a:txBody>
+                    <a:bodyPr/>
+                    <a:lstStyle/>
+                    <a:p>
+                      <a:r>
+                        <a:rPr lang="en-GB" sz="1100" dirty="0"/>
+                        <a:t>Type</a:t>
+                      </a:r>
+                    </a:p>
+                  </a:txBody>
+                  <a:tcPr marL="54475" marR="54475" marT="27238" marB="27238"/>
+                </a:tc>
+                <a:extLst>
+                  <a:ext uri="{0D108BD9-81ED-4DB2-BD59-A6C34878D82A}">
+                    <a16:rowId xmlns:a16="http://schemas.microsoft.com/office/drawing/2014/main" val="4150427295"/>
+                  </a:ext>
+                </a:extLst>
+              </a:tr>
+              <a:tr h="331518">
+                <a:tc>
+                  <a:txBody>
+                    <a:bodyPr/>
+                    <a:lstStyle/>
+                    <a:p>
+                      <a:r>
+                        <a:rPr lang="en-GB" sz="1100" b="1" u="sng" dirty="0"/>
+                        <a:t>Lecture_ID</a:t>
+                      </a:r>
+                    </a:p>
+                  </a:txBody>
+                  <a:tcPr marL="54475" marR="54475" marT="27238" marB="27238"/>
+                </a:tc>
+                <a:tc>
+                  <a:txBody>
+                    <a:bodyPr/>
+                    <a:lstStyle/>
+                    <a:p>
+                      <a:r>
+                        <a:rPr lang="en-GB" sz="1100" dirty="0"/>
+                        <a:t>IntegerField</a:t>
+                      </a:r>
+                    </a:p>
+                  </a:txBody>
+                  <a:tcPr marL="54475" marR="54475" marT="27238" marB="27238"/>
+                </a:tc>
+                <a:extLst>
+                  <a:ext uri="{0D108BD9-81ED-4DB2-BD59-A6C34878D82A}">
+                    <a16:rowId xmlns:a16="http://schemas.microsoft.com/office/drawing/2014/main" val="20519223"/>
+                  </a:ext>
+                </a:extLst>
+              </a:tr>
+              <a:tr h="331518">
+                <a:tc>
+                  <a:txBody>
+                    <a:bodyPr/>
+                    <a:lstStyle/>
+                    <a:p>
+                      <a:r>
+                        <a:rPr lang="en-GB" sz="1100" b="1" u="none" dirty="0" err="1"/>
+                        <a:t>User_ID</a:t>
+                      </a:r>
+                      <a:r>
+                        <a:rPr lang="en-GB" sz="1100" b="1" u="none" dirty="0"/>
+                        <a:t>*</a:t>
+                      </a:r>
+                    </a:p>
+                  </a:txBody>
+                  <a:tcPr marL="54475" marR="54475" marT="27238" marB="27238"/>
+                </a:tc>
+                <a:tc>
+                  <a:txBody>
+                    <a:bodyPr/>
+                    <a:lstStyle/>
+                    <a:p>
+                      <a:r>
+                        <a:rPr lang="en-GB" sz="1100" dirty="0"/>
+                        <a:t>IntegerField</a:t>
+                      </a:r>
+                    </a:p>
+                  </a:txBody>
+                  <a:tcPr marL="54475" marR="54475" marT="27238" marB="27238"/>
+                </a:tc>
+                <a:extLst>
+                  <a:ext uri="{0D108BD9-81ED-4DB2-BD59-A6C34878D82A}">
+                    <a16:rowId xmlns:a16="http://schemas.microsoft.com/office/drawing/2014/main" val="2986257566"/>
+                  </a:ext>
+                </a:extLst>
+              </a:tr>
+            </a:tbl>
+          </a:graphicData>
+        </a:graphic>
+      </p:graphicFrame>
+      <p:sp>
+        <p:nvSpPr>
+          <p:cNvPr id="17" name="TextBox 16">
+            <a:extLst>
+              <a:ext uri="{FF2B5EF4-FFF2-40B4-BE49-F238E27FC236}">
+                <a16:creationId xmlns:a16="http://schemas.microsoft.com/office/drawing/2014/main" id="{B35AC068-A9A0-4603-9003-27844C2C3946}"/>
+              </a:ext>
+            </a:extLst>
+          </p:cNvPr>
+          <p:cNvSpPr txBox="1"/>
+          <p:nvPr/>
+        </p:nvSpPr>
+        <p:spPr>
+          <a:xfrm>
+            <a:off x="2998638" y="5283415"/>
+            <a:ext cx="2120896" cy="369332"/>
+          </a:xfrm>
+          <a:prstGeom prst="rect">
+            <a:avLst/>
+          </a:prstGeom>
+          <a:noFill/>
+        </p:spPr>
+        <p:txBody>
+          <a:bodyPr wrap="square" rtlCol="0">
+            <a:spAutoFit/>
+          </a:bodyPr>
+          <a:lstStyle/>
+          <a:p>
+            <a:r>
+              <a:rPr lang="en-GB" dirty="0" err="1"/>
+              <a:t>SavedLecture</a:t>
+            </a:r>
+            <a:endParaRPr lang="en-GB" dirty="0"/>
+          </a:p>
+        </p:txBody>
+      </p:sp>
+    </p:spTree>
+    <p:extLst>
+      <p:ext uri="{BB962C8B-B14F-4D97-AF65-F5344CB8AC3E}">
+        <p14:creationId xmlns:p14="http://schemas.microsoft.com/office/powerpoint/2010/main" val="1913528824"/>
+      </p:ext>
+    </p:extLst>
+  </p:cSld>
+  <p:clrMapOvr>
+    <a:masterClrMapping/>
+  </p:clrMapOvr>
+</p:sld>
+</file>
+
+<file path=ppt/slides/slide12.xml><?xml version="1.0" encoding="utf-8"?>
+<p:sld xmlns:a="http://schemas.openxmlformats.org/drawingml/2006/main" xmlns:r="http://schemas.openxmlformats.org/officeDocument/2006/relationships" xmlns:p="http://schemas.openxmlformats.org/presentationml/2006/main">
+  <p:cSld>
+    <p:spTree>
+      <p:nvGrpSpPr>
+        <p:cNvPr id="1" name=""/>
+        <p:cNvGrpSpPr/>
+        <p:nvPr/>
+      </p:nvGrpSpPr>
+      <p:grpSpPr>
+        <a:xfrm>
+          <a:off x="0" y="0"/>
+          <a:ext cx="0" cy="0"/>
+          <a:chOff x="0" y="0"/>
+          <a:chExt cx="0" cy="0"/>
+        </a:xfrm>
+      </p:grpSpPr>
+      <p:sp>
+        <p:nvSpPr>
+          <p:cNvPr id="2" name="Title 1">
+            <a:extLst>
+              <a:ext uri="{FF2B5EF4-FFF2-40B4-BE49-F238E27FC236}">
                 <a16:creationId xmlns:a16="http://schemas.microsoft.com/office/drawing/2014/main" id="{EAA9E18D-6439-40D7-8CC4-2EA82C8DA52E}"/>
               </a:ext>
             </a:extLst>
@@ -6709,7 +8165,7 @@
           <a:p>
             <a:r>
               <a:rPr lang="en-GB" dirty="0"/>
-              <a:t>ER Diagram (Chen notation)</a:t>
+              <a:t>ER Diagram (Compressed Chen Notation)</a:t>
             </a:r>
           </a:p>
         </p:txBody>
@@ -7625,6 +9081,45 @@
           </a:fontRef>
         </p:style>
       </p:cxnSp>
+      <p:sp>
+        <p:nvSpPr>
+          <p:cNvPr id="3" name="TextBox 2">
+            <a:extLst>
+              <a:ext uri="{FF2B5EF4-FFF2-40B4-BE49-F238E27FC236}">
+                <a16:creationId xmlns:a16="http://schemas.microsoft.com/office/drawing/2014/main" id="{77A6C71B-616D-47AB-9DB6-8894FD2E7C8E}"/>
+              </a:ext>
+            </a:extLst>
+          </p:cNvPr>
+          <p:cNvSpPr txBox="1"/>
+          <p:nvPr/>
+        </p:nvSpPr>
+        <p:spPr>
+          <a:xfrm>
+            <a:off x="4838635" y="2971225"/>
+            <a:ext cx="4493615" cy="923330"/>
+          </a:xfrm>
+          <a:prstGeom prst="rect">
+            <a:avLst/>
+          </a:prstGeom>
+          <a:noFill/>
+        </p:spPr>
+        <p:txBody>
+          <a:bodyPr wrap="square" rtlCol="0">
+            <a:spAutoFit/>
+          </a:bodyPr>
+          <a:lstStyle/>
+          <a:p>
+            <a:r>
+              <a:rPr lang="en-GB" dirty="0">
+                <a:solidFill>
+                  <a:srgbClr val="FF0000"/>
+                </a:solidFill>
+              </a:rPr>
+              <a:t>!!!!! OLD ER DIAGRAM, WILL REMOVE THIS ONCE WE CONFIRM THE UPDATED ONE IS ALL CORRECT :D !!!!</a:t>
+            </a:r>
+          </a:p>
+        </p:txBody>
+      </p:sp>
     </p:spTree>
     <p:extLst>
       <p:ext uri="{BB962C8B-B14F-4D97-AF65-F5344CB8AC3E}">

</xml_diff>

<commit_message>
ERD&Table designs. Fixed wireframes
</commit_message>
<xml_diff>
--- a/DesignSpecification.pptx
+++ b/DesignSpecification.pptx
@@ -278,7 +278,7 @@
           <a:p>
             <a:fld id="{95092FE3-F51D-0C4A-A1D2-112694A4D9A8}" type="datetimeFigureOut">
               <a:rPr lang="en-US" smtClean="0"/>
-              <a:t>2/23/22</a:t>
+              <a:t>2/24/22</a:t>
             </a:fld>
             <a:endParaRPr lang="en-US"/>
           </a:p>
@@ -478,7 +478,7 @@
           <a:p>
             <a:fld id="{95092FE3-F51D-0C4A-A1D2-112694A4D9A8}" type="datetimeFigureOut">
               <a:rPr lang="en-US" smtClean="0"/>
-              <a:t>2/23/22</a:t>
+              <a:t>2/24/22</a:t>
             </a:fld>
             <a:endParaRPr lang="en-US"/>
           </a:p>
@@ -688,7 +688,7 @@
           <a:p>
             <a:fld id="{95092FE3-F51D-0C4A-A1D2-112694A4D9A8}" type="datetimeFigureOut">
               <a:rPr lang="en-US" smtClean="0"/>
-              <a:t>2/23/22</a:t>
+              <a:t>2/24/22</a:t>
             </a:fld>
             <a:endParaRPr lang="en-US"/>
           </a:p>
@@ -888,7 +888,7 @@
           <a:p>
             <a:fld id="{95092FE3-F51D-0C4A-A1D2-112694A4D9A8}" type="datetimeFigureOut">
               <a:rPr lang="en-US" smtClean="0"/>
-              <a:t>2/23/22</a:t>
+              <a:t>2/24/22</a:t>
             </a:fld>
             <a:endParaRPr lang="en-US"/>
           </a:p>
@@ -1164,7 +1164,7 @@
           <a:p>
             <a:fld id="{95092FE3-F51D-0C4A-A1D2-112694A4D9A8}" type="datetimeFigureOut">
               <a:rPr lang="en-US" smtClean="0"/>
-              <a:t>2/23/22</a:t>
+              <a:t>2/24/22</a:t>
             </a:fld>
             <a:endParaRPr lang="en-US"/>
           </a:p>
@@ -1432,7 +1432,7 @@
           <a:p>
             <a:fld id="{95092FE3-F51D-0C4A-A1D2-112694A4D9A8}" type="datetimeFigureOut">
               <a:rPr lang="en-US" smtClean="0"/>
-              <a:t>2/23/22</a:t>
+              <a:t>2/24/22</a:t>
             </a:fld>
             <a:endParaRPr lang="en-US"/>
           </a:p>
@@ -1847,7 +1847,7 @@
           <a:p>
             <a:fld id="{95092FE3-F51D-0C4A-A1D2-112694A4D9A8}" type="datetimeFigureOut">
               <a:rPr lang="en-US" smtClean="0"/>
-              <a:t>2/23/22</a:t>
+              <a:t>2/24/22</a:t>
             </a:fld>
             <a:endParaRPr lang="en-US"/>
           </a:p>
@@ -1989,7 +1989,7 @@
           <a:p>
             <a:fld id="{95092FE3-F51D-0C4A-A1D2-112694A4D9A8}" type="datetimeFigureOut">
               <a:rPr lang="en-US" smtClean="0"/>
-              <a:t>2/23/22</a:t>
+              <a:t>2/24/22</a:t>
             </a:fld>
             <a:endParaRPr lang="en-US"/>
           </a:p>
@@ -2102,7 +2102,7 @@
           <a:p>
             <a:fld id="{95092FE3-F51D-0C4A-A1D2-112694A4D9A8}" type="datetimeFigureOut">
               <a:rPr lang="en-US" smtClean="0"/>
-              <a:t>2/23/22</a:t>
+              <a:t>2/24/22</a:t>
             </a:fld>
             <a:endParaRPr lang="en-US"/>
           </a:p>
@@ -2415,7 +2415,7 @@
           <a:p>
             <a:fld id="{95092FE3-F51D-0C4A-A1D2-112694A4D9A8}" type="datetimeFigureOut">
               <a:rPr lang="en-US" smtClean="0"/>
-              <a:t>2/23/22</a:t>
+              <a:t>2/24/22</a:t>
             </a:fld>
             <a:endParaRPr lang="en-US"/>
           </a:p>
@@ -2704,7 +2704,7 @@
           <a:p>
             <a:fld id="{95092FE3-F51D-0C4A-A1D2-112694A4D9A8}" type="datetimeFigureOut">
               <a:rPr lang="en-US" smtClean="0"/>
-              <a:t>2/23/22</a:t>
+              <a:t>2/24/22</a:t>
             </a:fld>
             <a:endParaRPr lang="en-US"/>
           </a:p>
@@ -2947,7 +2947,7 @@
           <a:p>
             <a:fld id="{95092FE3-F51D-0C4A-A1D2-112694A4D9A8}" type="datetimeFigureOut">
               <a:rPr lang="en-US" smtClean="0"/>
-              <a:t>2/23/22</a:t>
+              <a:t>2/24/22</a:t>
             </a:fld>
             <a:endParaRPr lang="en-US"/>
           </a:p>
@@ -9624,7 +9624,7 @@
         <p:spPr>
           <a:xfrm>
             <a:off x="1056289" y="1001220"/>
-            <a:ext cx="10079420" cy="5669674"/>
+            <a:ext cx="10079420" cy="5669673"/>
           </a:xfrm>
           <a:prstGeom prst="rect">
             <a:avLst/>

</xml_diff>